<commit_message>
Removed videos from public repository.
</commit_message>
<xml_diff>
--- a/slides/101_a_Promo.pptx
+++ b/slides/101_a_Promo.pptx
@@ -5178,7 +5178,7 @@
 </file>
 
 <file path=ppt/slides/slide3.xml><?xml version="1.0" encoding="utf-8"?>
-<p:sld xmlns:a="http://schemas.openxmlformats.org/drawingml/2006/main" xmlns:r="http://schemas.openxmlformats.org/officeDocument/2006/relationships" xmlns:p="http://schemas.openxmlformats.org/presentationml/2006/main">
+<p:sld xmlns:a="http://schemas.openxmlformats.org/drawingml/2006/main" xmlns:r="http://schemas.openxmlformats.org/officeDocument/2006/relationships" xmlns:p="http://schemas.openxmlformats.org/presentationml/2006/main" show="0">
   <p:cSld>
     <p:spTree>
       <p:nvGrpSpPr>
@@ -5535,13 +5535,8 @@
           <a:p>
             <a:r>
               <a:rPr lang="de-DE" dirty="0"/>
-              <a:t>Ein wenig </a:t>
-            </a:r>
-            <a:r>
-              <a:rPr lang="de-DE"/>
-              <a:t>(mehr) Programmiererfahrung</a:t>
-            </a:r>
-            <a:endParaRPr lang="de-DE" dirty="0"/>
+              <a:t>Ein wenig (mehr) Programmiererfahrung</a:t>
+            </a:r>
           </a:p>
           <a:p>
             <a:r>
@@ -5553,12 +5548,6 @@
             <a:r>
               <a:rPr lang="de-DE" dirty="0"/>
               <a:t>Spaß am Experimentieren</a:t>
-            </a:r>
-          </a:p>
-          <a:p>
-            <a:r>
-              <a:rPr lang="de-DE" dirty="0"/>
-              <a:t>Eine schalldichte Zimmertür</a:t>
             </a:r>
           </a:p>
         </p:txBody>
@@ -5593,6 +5582,53 @@
           </a:p>
         </p:txBody>
       </p:sp>
+      <p:pic>
+        <p:nvPicPr>
+          <p:cNvPr id="5" name="Picture 6" descr="Python Software Foundation – Wikipedia">
+            <a:extLst>
+              <a:ext uri="{FF2B5EF4-FFF2-40B4-BE49-F238E27FC236}">
+                <a16:creationId xmlns:a16="http://schemas.microsoft.com/office/drawing/2014/main" id="{D3855C01-34B8-4A55-B4E5-ED8AC5F2FEFB}"/>
+              </a:ext>
+            </a:extLst>
+          </p:cNvPr>
+          <p:cNvPicPr>
+            <a:picLocks noChangeAspect="1" noChangeArrowheads="1"/>
+          </p:cNvPicPr>
+          <p:nvPr/>
+        </p:nvPicPr>
+        <p:blipFill>
+          <a:blip r:embed="rId2">
+            <a:extLst>
+              <a:ext uri="{28A0092B-C50C-407E-A947-70E740481C1C}">
+                <a14:useLocalDpi xmlns:a14="http://schemas.microsoft.com/office/drawing/2010/main" val="0"/>
+              </a:ext>
+            </a:extLst>
+          </a:blip>
+          <a:srcRect/>
+          <a:stretch>
+            <a:fillRect/>
+          </a:stretch>
+        </p:blipFill>
+        <p:spPr bwMode="auto">
+          <a:xfrm>
+            <a:off x="8319015" y="2864142"/>
+            <a:ext cx="2467062" cy="2467062"/>
+          </a:xfrm>
+          <a:prstGeom prst="rect">
+            <a:avLst/>
+          </a:prstGeom>
+          <a:noFill/>
+          <a:extLst>
+            <a:ext uri="{909E8E84-426E-40DD-AFC4-6F175D3DCCD1}">
+              <a14:hiddenFill xmlns:a14="http://schemas.microsoft.com/office/drawing/2010/main">
+                <a:solidFill>
+                  <a:srgbClr val="FFFFFF"/>
+                </a:solidFill>
+              </a14:hiddenFill>
+            </a:ext>
+          </a:extLst>
+        </p:spPr>
+      </p:pic>
     </p:spTree>
     <p:extLst>
       <p:ext uri="{BB962C8B-B14F-4D97-AF65-F5344CB8AC3E}">

</xml_diff>